<commit_message>
index, welcome and intro page
</commit_message>
<xml_diff>
--- a/docs/layout/Aufbau der Homepage.pptx
+++ b/docs/layout/Aufbau der Homepage.pptx
@@ -194,7 +194,7 @@
           <a:p>
             <a:fld id="{00EDF529-4AEF-47F1-9A59-B4114E9EC42D}" type="datetimeFigureOut">
               <a:rPr lang="de-DE" smtClean="0"/>
-              <a:t>06.07.2017</a:t>
+              <a:t>12.07.2017</a:t>
             </a:fld>
             <a:endParaRPr lang="de-DE"/>
           </a:p>
@@ -355,13 +355,18 @@
           <a:p>
             <a:fld id="{A9C80C94-F650-4D98-B151-059E850439C0}" type="slidenum">
               <a:rPr lang="de-DE" smtClean="0"/>
-              <a:t>‹Nr.›</a:t>
+              <a:t>‹#›</a:t>
             </a:fld>
             <a:endParaRPr lang="de-DE"/>
           </a:p>
         </p:txBody>
       </p:sp>
     </p:spTree>
+    <p:extLst>
+      <p:ext uri="{BB962C8B-B14F-4D97-AF65-F5344CB8AC3E}">
+        <p14:creationId xmlns:p14="http://schemas.microsoft.com/office/powerpoint/2010/main" val="1925302210"/>
+      </p:ext>
+    </p:extLst>
   </p:cSld>
   <p:clrMap bg1="lt1" tx1="dk1" bg2="lt2" tx2="dk2" accent1="accent1" accent2="accent2" accent3="accent3" accent4="accent4" accent5="accent5" accent6="accent6" hlink="hlink" folHlink="folHlink"/>
   <p:notesStyle>
@@ -722,7 +727,7 @@
             <a:fld id="{CD2A3656-F910-4F67-A6FE-A5FFC0FC92D4}" type="datetimeFigureOut">
               <a:rPr lang="de-DE" smtClean="0"/>
               <a:pPr/>
-              <a:t>06.07.2017</a:t>
+              <a:t>12.07.2017</a:t>
             </a:fld>
             <a:endParaRPr lang="de-DE"/>
           </a:p>
@@ -765,7 +770,7 @@
             <a:fld id="{D4986B24-535B-477C-A50F-7B52DC2F5C14}" type="slidenum">
               <a:rPr lang="de-DE" smtClean="0"/>
               <a:pPr/>
-              <a:t>‹Nr.›</a:t>
+              <a:t>‹#›</a:t>
             </a:fld>
             <a:endParaRPr lang="de-DE"/>
           </a:p>
@@ -774,7 +779,7 @@
     </p:spTree>
     <p:extLst>
       <p:ext uri="{BB962C8B-B14F-4D97-AF65-F5344CB8AC3E}">
-        <p14:creationId xmlns:p14="http://schemas.microsoft.com/office/powerpoint/2010/main" xmlns="" val="3880703229"/>
+        <p14:creationId xmlns:p14="http://schemas.microsoft.com/office/powerpoint/2010/main" val="3880703229"/>
       </p:ext>
     </p:extLst>
   </p:cSld>
@@ -894,7 +899,7 @@
             <a:fld id="{CD2A3656-F910-4F67-A6FE-A5FFC0FC92D4}" type="datetimeFigureOut">
               <a:rPr lang="de-DE" smtClean="0"/>
               <a:pPr/>
-              <a:t>06.07.2017</a:t>
+              <a:t>12.07.2017</a:t>
             </a:fld>
             <a:endParaRPr lang="de-DE"/>
           </a:p>
@@ -937,7 +942,7 @@
             <a:fld id="{D4986B24-535B-477C-A50F-7B52DC2F5C14}" type="slidenum">
               <a:rPr lang="de-DE" smtClean="0"/>
               <a:pPr/>
-              <a:t>‹Nr.›</a:t>
+              <a:t>‹#›</a:t>
             </a:fld>
             <a:endParaRPr lang="de-DE"/>
           </a:p>
@@ -946,7 +951,7 @@
     </p:spTree>
     <p:extLst>
       <p:ext uri="{BB962C8B-B14F-4D97-AF65-F5344CB8AC3E}">
-        <p14:creationId xmlns:p14="http://schemas.microsoft.com/office/powerpoint/2010/main" xmlns="" val="3522316022"/>
+        <p14:creationId xmlns:p14="http://schemas.microsoft.com/office/powerpoint/2010/main" val="3522316022"/>
       </p:ext>
     </p:extLst>
   </p:cSld>
@@ -1076,7 +1081,7 @@
             <a:fld id="{CD2A3656-F910-4F67-A6FE-A5FFC0FC92D4}" type="datetimeFigureOut">
               <a:rPr lang="de-DE" smtClean="0"/>
               <a:pPr/>
-              <a:t>06.07.2017</a:t>
+              <a:t>12.07.2017</a:t>
             </a:fld>
             <a:endParaRPr lang="de-DE"/>
           </a:p>
@@ -1119,7 +1124,7 @@
             <a:fld id="{D4986B24-535B-477C-A50F-7B52DC2F5C14}" type="slidenum">
               <a:rPr lang="de-DE" smtClean="0"/>
               <a:pPr/>
-              <a:t>‹Nr.›</a:t>
+              <a:t>‹#›</a:t>
             </a:fld>
             <a:endParaRPr lang="de-DE"/>
           </a:p>
@@ -1128,7 +1133,7 @@
     </p:spTree>
     <p:extLst>
       <p:ext uri="{BB962C8B-B14F-4D97-AF65-F5344CB8AC3E}">
-        <p14:creationId xmlns:p14="http://schemas.microsoft.com/office/powerpoint/2010/main" xmlns="" val="3924263207"/>
+        <p14:creationId xmlns:p14="http://schemas.microsoft.com/office/powerpoint/2010/main" val="3924263207"/>
       </p:ext>
     </p:extLst>
   </p:cSld>
@@ -1248,7 +1253,7 @@
             <a:fld id="{CD2A3656-F910-4F67-A6FE-A5FFC0FC92D4}" type="datetimeFigureOut">
               <a:rPr lang="de-DE" smtClean="0"/>
               <a:pPr/>
-              <a:t>06.07.2017</a:t>
+              <a:t>12.07.2017</a:t>
             </a:fld>
             <a:endParaRPr lang="de-DE"/>
           </a:p>
@@ -1291,7 +1296,7 @@
             <a:fld id="{D4986B24-535B-477C-A50F-7B52DC2F5C14}" type="slidenum">
               <a:rPr lang="de-DE" smtClean="0"/>
               <a:pPr/>
-              <a:t>‹Nr.›</a:t>
+              <a:t>‹#›</a:t>
             </a:fld>
             <a:endParaRPr lang="de-DE"/>
           </a:p>
@@ -1300,7 +1305,7 @@
     </p:spTree>
     <p:extLst>
       <p:ext uri="{BB962C8B-B14F-4D97-AF65-F5344CB8AC3E}">
-        <p14:creationId xmlns:p14="http://schemas.microsoft.com/office/powerpoint/2010/main" xmlns="" val="939147354"/>
+        <p14:creationId xmlns:p14="http://schemas.microsoft.com/office/powerpoint/2010/main" val="939147354"/>
       </p:ext>
     </p:extLst>
   </p:cSld>
@@ -1496,7 +1501,7 @@
             <a:fld id="{CD2A3656-F910-4F67-A6FE-A5FFC0FC92D4}" type="datetimeFigureOut">
               <a:rPr lang="de-DE" smtClean="0"/>
               <a:pPr/>
-              <a:t>06.07.2017</a:t>
+              <a:t>12.07.2017</a:t>
             </a:fld>
             <a:endParaRPr lang="de-DE"/>
           </a:p>
@@ -1539,7 +1544,7 @@
             <a:fld id="{D4986B24-535B-477C-A50F-7B52DC2F5C14}" type="slidenum">
               <a:rPr lang="de-DE" smtClean="0"/>
               <a:pPr/>
-              <a:t>‹Nr.›</a:t>
+              <a:t>‹#›</a:t>
             </a:fld>
             <a:endParaRPr lang="de-DE"/>
           </a:p>
@@ -1548,7 +1553,7 @@
     </p:spTree>
     <p:extLst>
       <p:ext uri="{BB962C8B-B14F-4D97-AF65-F5344CB8AC3E}">
-        <p14:creationId xmlns:p14="http://schemas.microsoft.com/office/powerpoint/2010/main" xmlns="" val="229169136"/>
+        <p14:creationId xmlns:p14="http://schemas.microsoft.com/office/powerpoint/2010/main" val="229169136"/>
       </p:ext>
     </p:extLst>
   </p:cSld>
@@ -1786,7 +1791,7 @@
             <a:fld id="{CD2A3656-F910-4F67-A6FE-A5FFC0FC92D4}" type="datetimeFigureOut">
               <a:rPr lang="de-DE" smtClean="0"/>
               <a:pPr/>
-              <a:t>06.07.2017</a:t>
+              <a:t>12.07.2017</a:t>
             </a:fld>
             <a:endParaRPr lang="de-DE"/>
           </a:p>
@@ -1829,7 +1834,7 @@
             <a:fld id="{D4986B24-535B-477C-A50F-7B52DC2F5C14}" type="slidenum">
               <a:rPr lang="de-DE" smtClean="0"/>
               <a:pPr/>
-              <a:t>‹Nr.›</a:t>
+              <a:t>‹#›</a:t>
             </a:fld>
             <a:endParaRPr lang="de-DE"/>
           </a:p>
@@ -1838,7 +1843,7 @@
     </p:spTree>
     <p:extLst>
       <p:ext uri="{BB962C8B-B14F-4D97-AF65-F5344CB8AC3E}">
-        <p14:creationId xmlns:p14="http://schemas.microsoft.com/office/powerpoint/2010/main" xmlns="" val="3713508556"/>
+        <p14:creationId xmlns:p14="http://schemas.microsoft.com/office/powerpoint/2010/main" val="3713508556"/>
       </p:ext>
     </p:extLst>
   </p:cSld>
@@ -2210,7 +2215,7 @@
             <a:fld id="{CD2A3656-F910-4F67-A6FE-A5FFC0FC92D4}" type="datetimeFigureOut">
               <a:rPr lang="de-DE" smtClean="0"/>
               <a:pPr/>
-              <a:t>06.07.2017</a:t>
+              <a:t>12.07.2017</a:t>
             </a:fld>
             <a:endParaRPr lang="de-DE"/>
           </a:p>
@@ -2253,7 +2258,7 @@
             <a:fld id="{D4986B24-535B-477C-A50F-7B52DC2F5C14}" type="slidenum">
               <a:rPr lang="de-DE" smtClean="0"/>
               <a:pPr/>
-              <a:t>‹Nr.›</a:t>
+              <a:t>‹#›</a:t>
             </a:fld>
             <a:endParaRPr lang="de-DE"/>
           </a:p>
@@ -2262,7 +2267,7 @@
     </p:spTree>
     <p:extLst>
       <p:ext uri="{BB962C8B-B14F-4D97-AF65-F5344CB8AC3E}">
-        <p14:creationId xmlns:p14="http://schemas.microsoft.com/office/powerpoint/2010/main" xmlns="" val="1069806932"/>
+        <p14:creationId xmlns:p14="http://schemas.microsoft.com/office/powerpoint/2010/main" val="1069806932"/>
       </p:ext>
     </p:extLst>
   </p:cSld>
@@ -2330,7 +2335,7 @@
             <a:fld id="{CD2A3656-F910-4F67-A6FE-A5FFC0FC92D4}" type="datetimeFigureOut">
               <a:rPr lang="de-DE" smtClean="0"/>
               <a:pPr/>
-              <a:t>06.07.2017</a:t>
+              <a:t>12.07.2017</a:t>
             </a:fld>
             <a:endParaRPr lang="de-DE"/>
           </a:p>
@@ -2373,7 +2378,7 @@
             <a:fld id="{D4986B24-535B-477C-A50F-7B52DC2F5C14}" type="slidenum">
               <a:rPr lang="de-DE" smtClean="0"/>
               <a:pPr/>
-              <a:t>‹Nr.›</a:t>
+              <a:t>‹#›</a:t>
             </a:fld>
             <a:endParaRPr lang="de-DE"/>
           </a:p>
@@ -2382,7 +2387,7 @@
     </p:spTree>
     <p:extLst>
       <p:ext uri="{BB962C8B-B14F-4D97-AF65-F5344CB8AC3E}">
-        <p14:creationId xmlns:p14="http://schemas.microsoft.com/office/powerpoint/2010/main" xmlns="" val="3574114408"/>
+        <p14:creationId xmlns:p14="http://schemas.microsoft.com/office/powerpoint/2010/main" val="3574114408"/>
       </p:ext>
     </p:extLst>
   </p:cSld>
@@ -2427,7 +2432,7 @@
             <a:fld id="{CD2A3656-F910-4F67-A6FE-A5FFC0FC92D4}" type="datetimeFigureOut">
               <a:rPr lang="de-DE" smtClean="0"/>
               <a:pPr/>
-              <a:t>06.07.2017</a:t>
+              <a:t>12.07.2017</a:t>
             </a:fld>
             <a:endParaRPr lang="de-DE"/>
           </a:p>
@@ -2470,7 +2475,7 @@
             <a:fld id="{D4986B24-535B-477C-A50F-7B52DC2F5C14}" type="slidenum">
               <a:rPr lang="de-DE" smtClean="0"/>
               <a:pPr/>
-              <a:t>‹Nr.›</a:t>
+              <a:t>‹#›</a:t>
             </a:fld>
             <a:endParaRPr lang="de-DE"/>
           </a:p>
@@ -2479,7 +2484,7 @@
     </p:spTree>
     <p:extLst>
       <p:ext uri="{BB962C8B-B14F-4D97-AF65-F5344CB8AC3E}">
-        <p14:creationId xmlns:p14="http://schemas.microsoft.com/office/powerpoint/2010/main" xmlns="" val="1544948536"/>
+        <p14:creationId xmlns:p14="http://schemas.microsoft.com/office/powerpoint/2010/main" val="1544948536"/>
       </p:ext>
     </p:extLst>
   </p:cSld>
@@ -2706,7 +2711,7 @@
             <a:fld id="{CD2A3656-F910-4F67-A6FE-A5FFC0FC92D4}" type="datetimeFigureOut">
               <a:rPr lang="de-DE" smtClean="0"/>
               <a:pPr/>
-              <a:t>06.07.2017</a:t>
+              <a:t>12.07.2017</a:t>
             </a:fld>
             <a:endParaRPr lang="de-DE"/>
           </a:p>
@@ -2749,7 +2754,7 @@
             <a:fld id="{D4986B24-535B-477C-A50F-7B52DC2F5C14}" type="slidenum">
               <a:rPr lang="de-DE" smtClean="0"/>
               <a:pPr/>
-              <a:t>‹Nr.›</a:t>
+              <a:t>‹#›</a:t>
             </a:fld>
             <a:endParaRPr lang="de-DE"/>
           </a:p>
@@ -2758,7 +2763,7 @@
     </p:spTree>
     <p:extLst>
       <p:ext uri="{BB962C8B-B14F-4D97-AF65-F5344CB8AC3E}">
-        <p14:creationId xmlns:p14="http://schemas.microsoft.com/office/powerpoint/2010/main" xmlns="" val="2395411032"/>
+        <p14:creationId xmlns:p14="http://schemas.microsoft.com/office/powerpoint/2010/main" val="2395411032"/>
       </p:ext>
     </p:extLst>
   </p:cSld>
@@ -2965,7 +2970,7 @@
             <a:fld id="{CD2A3656-F910-4F67-A6FE-A5FFC0FC92D4}" type="datetimeFigureOut">
               <a:rPr lang="de-DE" smtClean="0"/>
               <a:pPr/>
-              <a:t>06.07.2017</a:t>
+              <a:t>12.07.2017</a:t>
             </a:fld>
             <a:endParaRPr lang="de-DE"/>
           </a:p>
@@ -3008,7 +3013,7 @@
             <a:fld id="{D4986B24-535B-477C-A50F-7B52DC2F5C14}" type="slidenum">
               <a:rPr lang="de-DE" smtClean="0"/>
               <a:pPr/>
-              <a:t>‹Nr.›</a:t>
+              <a:t>‹#›</a:t>
             </a:fld>
             <a:endParaRPr lang="de-DE"/>
           </a:p>
@@ -3017,7 +3022,7 @@
     </p:spTree>
     <p:extLst>
       <p:ext uri="{BB962C8B-B14F-4D97-AF65-F5344CB8AC3E}">
-        <p14:creationId xmlns:p14="http://schemas.microsoft.com/office/powerpoint/2010/main" xmlns="" val="1158150200"/>
+        <p14:creationId xmlns:p14="http://schemas.microsoft.com/office/powerpoint/2010/main" val="1158150200"/>
       </p:ext>
     </p:extLst>
   </p:cSld>
@@ -3180,7 +3185,7 @@
             <a:fld id="{CD2A3656-F910-4F67-A6FE-A5FFC0FC92D4}" type="datetimeFigureOut">
               <a:rPr lang="de-DE" smtClean="0"/>
               <a:pPr/>
-              <a:t>06.07.2017</a:t>
+              <a:t>12.07.2017</a:t>
             </a:fld>
             <a:endParaRPr lang="de-DE"/>
           </a:p>
@@ -3259,7 +3264,7 @@
             <a:fld id="{D4986B24-535B-477C-A50F-7B52DC2F5C14}" type="slidenum">
               <a:rPr lang="de-DE" smtClean="0"/>
               <a:pPr/>
-              <a:t>‹Nr.›</a:t>
+              <a:t>‹#›</a:t>
             </a:fld>
             <a:endParaRPr lang="de-DE"/>
           </a:p>
@@ -3268,7 +3273,7 @@
     </p:spTree>
     <p:extLst>
       <p:ext uri="{BB962C8B-B14F-4D97-AF65-F5344CB8AC3E}">
-        <p14:creationId xmlns:p14="http://schemas.microsoft.com/office/powerpoint/2010/main" xmlns="" val="4118285937"/>
+        <p14:creationId xmlns:p14="http://schemas.microsoft.com/office/powerpoint/2010/main" val="4118285937"/>
       </p:ext>
     </p:extLst>
   </p:cSld>
@@ -3791,7 +3796,7 @@
           <a:blip r:embed="rId3" cstate="print">
             <a:extLst>
               <a:ext uri="{28A0092B-C50C-407E-A947-70E740481C1C}">
-                <a14:useLocalDpi xmlns:a14="http://schemas.microsoft.com/office/drawing/2010/main" xmlns="" val="0"/>
+                <a14:useLocalDpi xmlns:a14="http://schemas.microsoft.com/office/drawing/2010/main" val="0"/>
               </a:ext>
             </a:extLst>
           </a:blip>
@@ -3811,7 +3816,7 @@
           <a:noFill/>
           <a:extLst>
             <a:ext uri="{909E8E84-426E-40DD-AFC4-6F175D3DCCD1}">
-              <a14:hiddenFill xmlns:a14="http://schemas.microsoft.com/office/drawing/2010/main" xmlns="">
+              <a14:hiddenFill xmlns:a14="http://schemas.microsoft.com/office/drawing/2010/main">
                 <a:solidFill>
                   <a:srgbClr val="FFFFFF"/>
                 </a:solidFill>
@@ -4073,7 +4078,7 @@
           <a:blip r:embed="rId4" cstate="print">
             <a:extLst>
               <a:ext uri="{28A0092B-C50C-407E-A947-70E740481C1C}">
-                <a14:useLocalDpi xmlns:a14="http://schemas.microsoft.com/office/drawing/2010/main" xmlns="" val="0"/>
+                <a14:useLocalDpi xmlns:a14="http://schemas.microsoft.com/office/drawing/2010/main" val="0"/>
               </a:ext>
             </a:extLst>
           </a:blip>
@@ -4093,7 +4098,7 @@
           <a:noFill/>
           <a:extLst>
             <a:ext uri="{909E8E84-426E-40DD-AFC4-6F175D3DCCD1}">
-              <a14:hiddenFill xmlns:a14="http://schemas.microsoft.com/office/drawing/2010/main" xmlns="">
+              <a14:hiddenFill xmlns:a14="http://schemas.microsoft.com/office/drawing/2010/main">
                 <a:solidFill>
                   <a:srgbClr val="FFFFFF"/>
                 </a:solidFill>
@@ -4137,7 +4142,7 @@
     </p:spTree>
     <p:extLst>
       <p:ext uri="{BB962C8B-B14F-4D97-AF65-F5344CB8AC3E}">
-        <p14:creationId xmlns:p14="http://schemas.microsoft.com/office/powerpoint/2010/main" xmlns="" val="2496547269"/>
+        <p14:creationId xmlns:p14="http://schemas.microsoft.com/office/powerpoint/2010/main" val="2496547269"/>
       </p:ext>
     </p:extLst>
   </p:cSld>
@@ -4352,17 +4357,7 @@
                 <a:latin typeface="Arial" pitchFamily="34" charset="0"/>
                 <a:cs typeface="Arial" pitchFamily="34" charset="0"/>
               </a:rPr>
-              <a:t>Umgang Datenschutz! </a:t>
-            </a:r>
-            <a:r>
-              <a:rPr lang="de-DE" sz="1600" dirty="0" smtClean="0">
-                <a:solidFill>
-                  <a:schemeClr val="tx1"/>
-                </a:solidFill>
-                <a:latin typeface="Arial" pitchFamily="34" charset="0"/>
-                <a:cs typeface="Arial" pitchFamily="34" charset="0"/>
-              </a:rPr>
-              <a:t>IZI </a:t>
+              <a:t>Umgang Datenschutz! IZI </a:t>
             </a:r>
             <a:r>
               <a:rPr lang="de-DE" sz="1600" smtClean="0">
@@ -4372,27 +4367,7 @@
                 <a:latin typeface="Arial" pitchFamily="34" charset="0"/>
                 <a:cs typeface="Arial" pitchFamily="34" charset="0"/>
               </a:rPr>
-              <a:t>erhält das Recht </a:t>
-            </a:r>
-            <a:r>
-              <a:rPr lang="de-DE" sz="1600" smtClean="0">
-                <a:solidFill>
-                  <a:schemeClr val="tx1"/>
-                </a:solidFill>
-                <a:latin typeface="Arial" pitchFamily="34" charset="0"/>
-                <a:cs typeface="Arial" pitchFamily="34" charset="0"/>
-              </a:rPr>
-              <a:t>zur </a:t>
-            </a:r>
-            <a:r>
-              <a:rPr lang="de-DE" sz="1600" smtClean="0">
-                <a:solidFill>
-                  <a:schemeClr val="tx1"/>
-                </a:solidFill>
-                <a:latin typeface="Arial" pitchFamily="34" charset="0"/>
-                <a:cs typeface="Arial" pitchFamily="34" charset="0"/>
-              </a:rPr>
-              <a:t>		Nutzung/Veröffentlichung der </a:t>
+              <a:t>erhält das Recht zur 		Nutzung/Veröffentlichung der </a:t>
             </a:r>
             <a:r>
               <a:rPr lang="de-DE" sz="1600" dirty="0" smtClean="0">
@@ -4412,17 +4387,7 @@
                 <a:latin typeface="Arial" pitchFamily="34" charset="0"/>
                 <a:cs typeface="Arial" pitchFamily="34" charset="0"/>
               </a:rPr>
-              <a:t>aus </a:t>
-            </a:r>
-            <a:r>
-              <a:rPr lang="de-DE" sz="1600" smtClean="0">
-                <a:solidFill>
-                  <a:schemeClr val="tx1"/>
-                </a:solidFill>
-                <a:latin typeface="Arial" pitchFamily="34" charset="0"/>
-                <a:cs typeface="Arial" pitchFamily="34" charset="0"/>
-              </a:rPr>
-              <a:t>	der </a:t>
+              <a:t>aus 	der </a:t>
             </a:r>
             <a:r>
               <a:rPr lang="de-DE" sz="1600" dirty="0" err="1" smtClean="0">
@@ -4444,13 +4409,6 @@
               </a:rPr>
               <a:t>)</a:t>
             </a:r>
-            <a:endParaRPr lang="de-DE" sz="1600" dirty="0" smtClean="0">
-              <a:solidFill>
-                <a:schemeClr val="tx1"/>
-              </a:solidFill>
-              <a:latin typeface="Arial" pitchFamily="34" charset="0"/>
-              <a:cs typeface="Arial" pitchFamily="34" charset="0"/>
-            </a:endParaRPr>
           </a:p>
           <a:p>
             <a:pPr algn="l"/>
@@ -4810,7 +4768,7 @@
     </p:spTree>
     <p:extLst>
       <p:ext uri="{BB962C8B-B14F-4D97-AF65-F5344CB8AC3E}">
-        <p14:creationId xmlns:p14="http://schemas.microsoft.com/office/powerpoint/2010/main" xmlns="" val="1379684824"/>
+        <p14:creationId xmlns:p14="http://schemas.microsoft.com/office/powerpoint/2010/main" val="1379684824"/>
       </p:ext>
     </p:extLst>
   </p:cSld>
@@ -4873,6 +4831,26 @@
               <a:t>C</a:t>
             </a:r>
             <a:r>
+              <a:rPr lang="de-DE" sz="1600" smtClean="0">
+                <a:solidFill>
+                  <a:schemeClr val="tx1"/>
+                </a:solidFill>
+                <a:latin typeface="Arial" pitchFamily="34" charset="0"/>
+                <a:cs typeface="Arial" pitchFamily="34" charset="0"/>
+              </a:rPr>
+              <a:t>	</a:t>
+            </a:r>
+            <a:r>
+              <a:rPr lang="de-DE" sz="1600" smtClean="0">
+                <a:solidFill>
+                  <a:schemeClr val="tx1"/>
+                </a:solidFill>
+                <a:latin typeface="Arial" pitchFamily="34" charset="0"/>
+                <a:cs typeface="Arial" pitchFamily="34" charset="0"/>
+              </a:rPr>
+              <a:t>Welcomebereich </a:t>
+            </a:r>
+            <a:r>
               <a:rPr lang="de-DE" sz="1600" dirty="0" smtClean="0">
                 <a:solidFill>
                   <a:schemeClr val="tx1"/>
@@ -4880,7 +4858,7 @@
                 <a:latin typeface="Arial" pitchFamily="34" charset="0"/>
                 <a:cs typeface="Arial" pitchFamily="34" charset="0"/>
               </a:rPr>
-              <a:t>	Materialbereich (Login geschützter Bereich)</a:t>
+              <a:t>(Login geschützter Bereich)</a:t>
             </a:r>
           </a:p>
           <a:p>
@@ -4952,25 +4930,8 @@
                 <a:latin typeface="Arial" pitchFamily="34" charset="0"/>
                 <a:cs typeface="Arial" pitchFamily="34" charset="0"/>
               </a:rPr>
-              <a:t>Hinweis: Nutzung/Veröffentlichung der fertigen Bücher auf </a:t>
-            </a:r>
-            <a:r>
-              <a:rPr lang="de-DE" sz="1600" smtClean="0">
-                <a:solidFill>
-                  <a:schemeClr val="tx1"/>
-                </a:solidFill>
-                <a:latin typeface="Arial" pitchFamily="34" charset="0"/>
-                <a:cs typeface="Arial" pitchFamily="34" charset="0"/>
-              </a:rPr>
-              <a:t>der Homepage</a:t>
-            </a:r>
-            <a:endParaRPr lang="de-DE" sz="1600" dirty="0" smtClean="0">
-              <a:solidFill>
-                <a:schemeClr val="tx1"/>
-              </a:solidFill>
-              <a:latin typeface="Arial" pitchFamily="34" charset="0"/>
-              <a:cs typeface="Arial" pitchFamily="34" charset="0"/>
-            </a:endParaRPr>
+              <a:t>Hinweis: Nutzung/Veröffentlichung der fertigen Bücher auf der Homepage</a:t>
+            </a:r>
           </a:p>
         </p:txBody>
       </p:sp>
@@ -5587,7 +5548,7 @@
         <p:spPr>
           <a:xfrm>
             <a:off x="3352355" y="2026076"/>
-            <a:ext cx="724717" cy="600164"/>
+            <a:ext cx="724717" cy="430887"/>
           </a:xfrm>
           <a:prstGeom prst="rect">
             <a:avLst/>
@@ -5608,7 +5569,15 @@
             <a:pPr algn="ctr"/>
             <a:r>
               <a:rPr lang="de-DE" sz="1100" dirty="0" smtClean="0"/>
-              <a:t>Button 11.1.: App</a:t>
+              <a:t>Button </a:t>
+            </a:r>
+            <a:r>
+              <a:rPr lang="de-DE" sz="1100" dirty="0" smtClean="0"/>
+              <a:t>11.: </a:t>
+            </a:r>
+            <a:r>
+              <a:rPr lang="de-DE" sz="1100" dirty="0" smtClean="0"/>
+              <a:t>App</a:t>
             </a:r>
             <a:endParaRPr lang="de-DE" sz="1100" dirty="0"/>
           </a:p>
@@ -5902,7 +5871,7 @@
     </p:spTree>
     <p:extLst>
       <p:ext uri="{BB962C8B-B14F-4D97-AF65-F5344CB8AC3E}">
-        <p14:creationId xmlns:p14="http://schemas.microsoft.com/office/powerpoint/2010/main" xmlns="" val="366598591"/>
+        <p14:creationId xmlns:p14="http://schemas.microsoft.com/office/powerpoint/2010/main" val="366598591"/>
       </p:ext>
     </p:extLst>
   </p:cSld>

</xml_diff>